<commit_message>
refactor init and R/ folder
</commit_message>
<xml_diff>
--- a/doc/stock_dashboard_documentation.pptx
+++ b/doc/stock_dashboard_documentation.pptx
@@ -3166,7 +3166,6 @@
               <a:rPr lang="nl-BE" sz="1800" dirty="0" smtClean="0"/>
               <a:t>contains messages shown in notification corner as well as notification menu</a:t>
             </a:r>
-            <a:endParaRPr lang="nl-BE" sz="1800" dirty="0" smtClean="0"/>
           </a:p>
         </p:txBody>
       </p:sp>
@@ -3373,11 +3372,7 @@
             </a:r>
             <a:r>
               <a:rPr lang="nl-BE" sz="2400" dirty="0" smtClean="0"/>
-              <a:t>held,</a:t>
-            </a:r>
-            <a:r>
-              <a:rPr lang="nl-BE" sz="2400" dirty="0" smtClean="0"/>
-              <a:t> and compare that to the latest close price, </a:t>
+              <a:t>held, and compare that to the latest close price, </a:t>
             </a:r>
             <a:endParaRPr lang="nl-BE" sz="2400" dirty="0"/>
           </a:p>
@@ -7667,7 +7662,7 @@
         </p:nvSpPr>
         <p:spPr>
           <a:xfrm>
-            <a:off x="6567619" y="1154262"/>
+            <a:off x="6305038" y="774840"/>
             <a:ext cx="1402492" cy="654909"/>
           </a:xfrm>
           <a:prstGeom prst="chevron">
@@ -8342,8 +8337,8 @@
         </p:nvCxnSpPr>
         <p:spPr>
           <a:xfrm flipV="1">
-            <a:off x="6147489" y="1481717"/>
-            <a:ext cx="747585" cy="773392"/>
+            <a:off x="6147489" y="1102295"/>
+            <a:ext cx="485004" cy="1152814"/>
           </a:xfrm>
           <a:prstGeom prst="straightConnector1">
             <a:avLst/>
@@ -8475,6 +8470,120 @@
           </a:fontRef>
         </p:style>
       </p:cxnSp>
+      <p:sp>
+        <p:nvSpPr>
+          <p:cNvPr id="3" name="TextBox 2"/>
+          <p:cNvSpPr txBox="1"/>
+          <p:nvPr/>
+        </p:nvSpPr>
+        <p:spPr>
+          <a:xfrm>
+            <a:off x="7865078" y="183845"/>
+            <a:ext cx="4326922" cy="2308324"/>
+          </a:xfrm>
+          <a:prstGeom prst="rect">
+            <a:avLst/>
+          </a:prstGeom>
+          <a:noFill/>
+        </p:spPr>
+        <p:txBody>
+          <a:bodyPr wrap="square" rtlCol="0">
+            <a:spAutoFit/>
+          </a:bodyPr>
+          <a:lstStyle/>
+          <a:p>
+            <a:r>
+              <a:rPr lang="nl-BE" b="1" dirty="0"/>
+              <a:t>use reactive expressions for calculations</a:t>
+            </a:r>
+          </a:p>
+          <a:p>
+            <a:r>
+              <a:rPr lang="nl-BE" dirty="0" smtClean="0"/>
+              <a:t>reactive expressions are recipes for how to calculate something, shiny will determine when it is required to execute</a:t>
+            </a:r>
+          </a:p>
+          <a:p>
+            <a:r>
+              <a:rPr lang="nl-BE" dirty="0" smtClean="0"/>
+              <a:t>can accept reactive input and deliver reactive output</a:t>
+            </a:r>
+          </a:p>
+          <a:p>
+            <a:r>
+              <a:rPr lang="nl-BE" dirty="0" smtClean="0"/>
+              <a:t>has a cached result</a:t>
+            </a:r>
+          </a:p>
+          <a:p>
+            <a:r>
+              <a:rPr lang="nl-BE" dirty="0" smtClean="0"/>
+              <a:t>make maximum use of this feature in shiny</a:t>
+            </a:r>
+            <a:endParaRPr lang="en-US" dirty="0"/>
+          </a:p>
+        </p:txBody>
+      </p:sp>
+      <p:sp>
+        <p:nvSpPr>
+          <p:cNvPr id="35" name="TextBox 34"/>
+          <p:cNvSpPr txBox="1"/>
+          <p:nvPr/>
+        </p:nvSpPr>
+        <p:spPr>
+          <a:xfrm>
+            <a:off x="7293574" y="4613525"/>
+            <a:ext cx="4326922" cy="1200329"/>
+          </a:xfrm>
+          <a:prstGeom prst="rect">
+            <a:avLst/>
+          </a:prstGeom>
+          <a:noFill/>
+        </p:spPr>
+        <p:txBody>
+          <a:bodyPr wrap="square" rtlCol="0">
+            <a:spAutoFit/>
+          </a:bodyPr>
+          <a:lstStyle/>
+          <a:p>
+            <a:r>
+              <a:rPr lang="nl-BE" b="1" dirty="0" smtClean="0"/>
+              <a:t>use observers for side effects</a:t>
+            </a:r>
+          </a:p>
+          <a:p>
+            <a:pPr marL="285750" indent="-285750">
+              <a:buFontTx/>
+              <a:buChar char="-"/>
+            </a:pPr>
+            <a:r>
+              <a:rPr lang="nl-BE" dirty="0" smtClean="0"/>
+              <a:t>dealing with I/O (files / DB)</a:t>
+            </a:r>
+          </a:p>
+          <a:p>
+            <a:pPr marL="285750" indent="-285750">
+              <a:buFontTx/>
+              <a:buChar char="-"/>
+            </a:pPr>
+            <a:r>
+              <a:rPr lang="nl-BE" dirty="0" smtClean="0"/>
+              <a:t>setting reactive values!</a:t>
+            </a:r>
+          </a:p>
+          <a:p>
+            <a:pPr marL="285750" indent="-285750">
+              <a:buFontTx/>
+              <a:buChar char="-"/>
+            </a:pPr>
+            <a:r>
+              <a:rPr lang="nl-BE" dirty="0" smtClean="0"/>
+              <a:t>update input elements of the shiny app</a:t>
+            </a:r>
+            <a:endParaRPr lang="en-US" dirty="0"/>
+          </a:p>
+        </p:txBody>
+      </p:sp>
     </p:spTree>
     <p:extLst>
       <p:ext uri="{BB962C8B-B14F-4D97-AF65-F5344CB8AC3E}">

</xml_diff>

<commit_message>
reworking the whole authentication part
</commit_message>
<xml_diff>
--- a/doc/stock_dashboard_documentation.pptx
+++ b/doc/stock_dashboard_documentation.pptx
@@ -20,8 +20,9 @@
     <p:sldId id="274" r:id="rId14"/>
     <p:sldId id="269" r:id="rId15"/>
     <p:sldId id="275" r:id="rId16"/>
-    <p:sldId id="261" r:id="rId17"/>
-    <p:sldId id="258" r:id="rId18"/>
+    <p:sldId id="276" r:id="rId17"/>
+    <p:sldId id="261" r:id="rId18"/>
+    <p:sldId id="258" r:id="rId19"/>
   </p:sldIdLst>
   <p:sldSz cx="12192000" cy="6858000"/>
   <p:notesSz cx="6858000" cy="9144000"/>
@@ -259,7 +260,7 @@
           <a:p>
             <a:fld id="{C7A550C2-E7D9-4260-A406-70CCA9D8798D}" type="datetimeFigureOut">
               <a:rPr lang="en-US" smtClean="0"/>
-              <a:t>7/5/2022</a:t>
+              <a:t>9/23/2023</a:t>
             </a:fld>
             <a:endParaRPr lang="en-US"/>
           </a:p>
@@ -429,7 +430,7 @@
           <a:p>
             <a:fld id="{C7A550C2-E7D9-4260-A406-70CCA9D8798D}" type="datetimeFigureOut">
               <a:rPr lang="en-US" smtClean="0"/>
-              <a:t>7/5/2022</a:t>
+              <a:t>9/23/2023</a:t>
             </a:fld>
             <a:endParaRPr lang="en-US"/>
           </a:p>
@@ -609,7 +610,7 @@
           <a:p>
             <a:fld id="{C7A550C2-E7D9-4260-A406-70CCA9D8798D}" type="datetimeFigureOut">
               <a:rPr lang="en-US" smtClean="0"/>
-              <a:t>7/5/2022</a:t>
+              <a:t>9/23/2023</a:t>
             </a:fld>
             <a:endParaRPr lang="en-US"/>
           </a:p>
@@ -779,7 +780,7 @@
           <a:p>
             <a:fld id="{C7A550C2-E7D9-4260-A406-70CCA9D8798D}" type="datetimeFigureOut">
               <a:rPr lang="en-US" smtClean="0"/>
-              <a:t>7/5/2022</a:t>
+              <a:t>9/23/2023</a:t>
             </a:fld>
             <a:endParaRPr lang="en-US"/>
           </a:p>
@@ -1025,7 +1026,7 @@
           <a:p>
             <a:fld id="{C7A550C2-E7D9-4260-A406-70CCA9D8798D}" type="datetimeFigureOut">
               <a:rPr lang="en-US" smtClean="0"/>
-              <a:t>7/5/2022</a:t>
+              <a:t>9/23/2023</a:t>
             </a:fld>
             <a:endParaRPr lang="en-US"/>
           </a:p>
@@ -1257,7 +1258,7 @@
           <a:p>
             <a:fld id="{C7A550C2-E7D9-4260-A406-70CCA9D8798D}" type="datetimeFigureOut">
               <a:rPr lang="en-US" smtClean="0"/>
-              <a:t>7/5/2022</a:t>
+              <a:t>9/23/2023</a:t>
             </a:fld>
             <a:endParaRPr lang="en-US"/>
           </a:p>
@@ -1624,7 +1625,7 @@
           <a:p>
             <a:fld id="{C7A550C2-E7D9-4260-A406-70CCA9D8798D}" type="datetimeFigureOut">
               <a:rPr lang="en-US" smtClean="0"/>
-              <a:t>7/5/2022</a:t>
+              <a:t>9/23/2023</a:t>
             </a:fld>
             <a:endParaRPr lang="en-US"/>
           </a:p>
@@ -1742,7 +1743,7 @@
           <a:p>
             <a:fld id="{C7A550C2-E7D9-4260-A406-70CCA9D8798D}" type="datetimeFigureOut">
               <a:rPr lang="en-US" smtClean="0"/>
-              <a:t>7/5/2022</a:t>
+              <a:t>9/23/2023</a:t>
             </a:fld>
             <a:endParaRPr lang="en-US"/>
           </a:p>
@@ -1837,7 +1838,7 @@
           <a:p>
             <a:fld id="{C7A550C2-E7D9-4260-A406-70CCA9D8798D}" type="datetimeFigureOut">
               <a:rPr lang="en-US" smtClean="0"/>
-              <a:t>7/5/2022</a:t>
+              <a:t>9/23/2023</a:t>
             </a:fld>
             <a:endParaRPr lang="en-US"/>
           </a:p>
@@ -2114,7 +2115,7 @@
           <a:p>
             <a:fld id="{C7A550C2-E7D9-4260-A406-70CCA9D8798D}" type="datetimeFigureOut">
               <a:rPr lang="en-US" smtClean="0"/>
-              <a:t>7/5/2022</a:t>
+              <a:t>9/23/2023</a:t>
             </a:fld>
             <a:endParaRPr lang="en-US"/>
           </a:p>
@@ -2367,7 +2368,7 @@
           <a:p>
             <a:fld id="{C7A550C2-E7D9-4260-A406-70CCA9D8798D}" type="datetimeFigureOut">
               <a:rPr lang="en-US" smtClean="0"/>
-              <a:t>7/5/2022</a:t>
+              <a:t>9/23/2023</a:t>
             </a:fld>
             <a:endParaRPr lang="en-US"/>
           </a:p>
@@ -2580,7 +2581,7 @@
           <a:p>
             <a:fld id="{C7A550C2-E7D9-4260-A406-70CCA9D8798D}" type="datetimeFigureOut">
               <a:rPr lang="en-US" smtClean="0"/>
-              <a:t>7/5/2022</a:t>
+              <a:t>9/23/2023</a:t>
             </a:fld>
             <a:endParaRPr lang="en-US"/>
           </a:p>
@@ -5196,8 +5197,8 @@
           <a:lstStyle/>
           <a:p>
             <a:r>
-              <a:rPr lang="nl-BE" dirty="0" smtClean="0"/>
-              <a:t>ui</a:t>
+              <a:rPr lang="en-BE" dirty="0" smtClean="0"/>
+              <a:t>app</a:t>
             </a:r>
             <a:endParaRPr lang="en-US" dirty="0"/>
           </a:p>
@@ -5274,7 +5275,11 @@
           <a:bodyPr/>
           <a:lstStyle/>
           <a:p>
-            <a:endParaRPr lang="en-US"/>
+            <a:r>
+              <a:rPr lang="en-BE" dirty="0" smtClean="0"/>
+              <a:t>Shinymanager: authentication &amp; site monitoring</a:t>
+            </a:r>
+            <a:endParaRPr lang="en-US" dirty="0"/>
           </a:p>
         </p:txBody>
       </p:sp>
@@ -5290,13 +5295,201 @@
         </p:nvSpPr>
         <p:spPr/>
         <p:txBody>
-          <a:bodyPr/>
-          <a:lstStyle/>
-          <a:p>
-            <a:endParaRPr lang="en-US"/>
-          </a:p>
-        </p:txBody>
-      </p:sp>
+          <a:bodyPr>
+            <a:normAutofit fontScale="92500" lnSpcReduction="20000"/>
+          </a:bodyPr>
+          <a:lstStyle/>
+          <a:p>
+            <a:r>
+              <a:rPr lang="en-BE" dirty="0" smtClean="0"/>
+              <a:t>Auth is</a:t>
+            </a:r>
+            <a:r>
+              <a:rPr lang="en-BE" dirty="0" smtClean="0"/>
+              <a:t> done using shinymanager</a:t>
+            </a:r>
+          </a:p>
+          <a:p>
+            <a:pPr lvl="1"/>
+            <a:r>
+              <a:rPr lang="en-US" dirty="0">
+                <a:hlinkClick r:id="rId2"/>
+              </a:rPr>
+              <a:t>https://datastorm-open.github.io/shinymanager</a:t>
+            </a:r>
+            <a:r>
+              <a:rPr lang="en-US" dirty="0" smtClean="0">
+                <a:hlinkClick r:id="rId2"/>
+              </a:rPr>
+              <a:t>/</a:t>
+            </a:r>
+            <a:endParaRPr lang="en-BE" dirty="0" smtClean="0"/>
+          </a:p>
+          <a:p>
+            <a:r>
+              <a:rPr lang="en-BE" dirty="0" smtClean="0"/>
+              <a:t>Shinymanager can store credentials </a:t>
+            </a:r>
+            <a:r>
+              <a:rPr lang="en-BE" dirty="0"/>
+              <a:t>are stored in </a:t>
+            </a:r>
+            <a:r>
+              <a:rPr lang="en-BE" dirty="0" smtClean="0"/>
+              <a:t>sqlite</a:t>
+            </a:r>
+            <a:r>
+              <a:rPr lang="en-US" dirty="0" smtClean="0"/>
+              <a:t> database</a:t>
+            </a:r>
+            <a:endParaRPr lang="en-BE" dirty="0"/>
+          </a:p>
+          <a:p>
+            <a:r>
+              <a:rPr lang="en-BE" dirty="0" smtClean="0"/>
+              <a:t>Shinymanager </a:t>
+            </a:r>
+            <a:r>
+              <a:rPr lang="en-BE" dirty="0"/>
+              <a:t>provides an admin console with an overview of the site </a:t>
+            </a:r>
+            <a:r>
+              <a:rPr lang="en-BE" dirty="0" smtClean="0"/>
+              <a:t>usage, but only if you use the sqlite backend option.</a:t>
+            </a:r>
+          </a:p>
+          <a:p>
+            <a:endParaRPr lang="en-BE" dirty="0" smtClean="0"/>
+          </a:p>
+          <a:p>
+            <a:r>
+              <a:rPr lang="en-BE" dirty="0" smtClean="0"/>
+              <a:t>The sqlite DB is </a:t>
+            </a:r>
+            <a:r>
+              <a:rPr lang="en-US" dirty="0" smtClean="0"/>
+              <a:t>protected </a:t>
+            </a:r>
+            <a:r>
+              <a:rPr lang="en-US" dirty="0"/>
+              <a:t>with a symmetric AES encryption</a:t>
+            </a:r>
+            <a:r>
+              <a:rPr lang="en-BE" dirty="0"/>
+              <a:t>. To store the keys for this encryption it uses </a:t>
+            </a:r>
+            <a:r>
+              <a:rPr lang="en-BE" dirty="0" smtClean="0"/>
+              <a:t>the keyring package. This makes use of the OS credential store: w</a:t>
+            </a:r>
+            <a:r>
+              <a:rPr lang="en-US" dirty="0" smtClean="0"/>
+              <a:t>hen </a:t>
+            </a:r>
+            <a:r>
+              <a:rPr lang="en-US" dirty="0"/>
+              <a:t>you set a key using </a:t>
+            </a:r>
+            <a:r>
+              <a:rPr lang="en-US" dirty="0" err="1"/>
+              <a:t>key_set</a:t>
+            </a:r>
+            <a:r>
+              <a:rPr lang="en-US" dirty="0"/>
+              <a:t> </a:t>
+            </a:r>
+            <a:r>
+              <a:rPr lang="en-US" dirty="0" smtClean="0"/>
+              <a:t>it </a:t>
+            </a:r>
+            <a:r>
+              <a:rPr lang="en-US" dirty="0"/>
+              <a:t>is stored securely on the </a:t>
+            </a:r>
+            <a:r>
+              <a:rPr lang="en-BE" dirty="0" smtClean="0"/>
+              <a:t>local </a:t>
+            </a:r>
+            <a:r>
+              <a:rPr lang="en-US" dirty="0" smtClean="0"/>
+              <a:t>machine </a:t>
+            </a:r>
+            <a:endParaRPr lang="en-BE" dirty="0" smtClean="0"/>
+          </a:p>
+          <a:p>
+            <a:pPr lvl="1"/>
+            <a:r>
+              <a:rPr lang="en-US" b="1" dirty="0" smtClean="0"/>
+              <a:t>Windows</a:t>
+            </a:r>
+            <a:r>
+              <a:rPr lang="en-US" dirty="0"/>
+              <a:t>: It </a:t>
+            </a:r>
+            <a:r>
+              <a:rPr lang="en-US" dirty="0" smtClean="0"/>
+              <a:t>use</a:t>
+            </a:r>
+            <a:r>
+              <a:rPr lang="en-BE" dirty="0" smtClean="0"/>
+              <a:t>s</a:t>
+            </a:r>
+            <a:r>
+              <a:rPr lang="en-US" dirty="0" smtClean="0"/>
+              <a:t> </a:t>
+            </a:r>
+            <a:r>
+              <a:rPr lang="en-US" dirty="0"/>
+              <a:t>the Windows Credential Manager</a:t>
+            </a:r>
+            <a:r>
+              <a:rPr lang="en-US" dirty="0" smtClean="0"/>
+              <a:t>.</a:t>
+            </a:r>
+            <a:endParaRPr lang="en-BE" dirty="0" smtClean="0"/>
+          </a:p>
+          <a:p>
+            <a:pPr lvl="1"/>
+            <a:r>
+              <a:rPr lang="en-US" b="1" dirty="0"/>
+              <a:t>Linux</a:t>
+            </a:r>
+            <a:r>
+              <a:rPr lang="en-US" dirty="0"/>
+              <a:t>: It may use the Linux keyring or other secure storage mechanisms</a:t>
+            </a:r>
+            <a:r>
+              <a:rPr lang="en-US" dirty="0" smtClean="0"/>
+              <a:t>.</a:t>
+            </a:r>
+            <a:endParaRPr lang="en-BE" dirty="0" smtClean="0"/>
+          </a:p>
+        </p:txBody>
+      </p:sp>
+      <p:pic>
+        <p:nvPicPr>
+          <p:cNvPr id="4" name="Picture 3"/>
+          <p:cNvPicPr>
+            <a:picLocks noChangeAspect="1"/>
+          </p:cNvPicPr>
+          <p:nvPr/>
+        </p:nvPicPr>
+        <p:blipFill>
+          <a:blip r:embed="rId3"/>
+          <a:stretch>
+            <a:fillRect/>
+          </a:stretch>
+        </p:blipFill>
+        <p:spPr>
+          <a:xfrm>
+            <a:off x="10834144" y="1383618"/>
+            <a:ext cx="1181202" cy="1615580"/>
+          </a:xfrm>
+          <a:prstGeom prst="rect">
+            <a:avLst/>
+          </a:prstGeom>
+        </p:spPr>
+      </p:pic>
     </p:spTree>
     <p:extLst>
       <p:ext uri="{BB962C8B-B14F-4D97-AF65-F5344CB8AC3E}">
@@ -5311,6 +5504,175 @@
 </file>
 
 <file path=ppt/slides/slide16.xml><?xml version="1.0" encoding="utf-8"?>
+<p:sld xmlns:a="http://schemas.openxmlformats.org/drawingml/2006/main" xmlns:r="http://schemas.openxmlformats.org/officeDocument/2006/relationships" xmlns:p="http://schemas.openxmlformats.org/presentationml/2006/main">
+  <p:cSld>
+    <p:spTree>
+      <p:nvGrpSpPr>
+        <p:cNvPr id="1" name=""/>
+        <p:cNvGrpSpPr/>
+        <p:nvPr/>
+      </p:nvGrpSpPr>
+      <p:grpSpPr>
+        <a:xfrm>
+          <a:off x="0" y="0"/>
+          <a:ext cx="0" cy="0"/>
+          <a:chOff x="0" y="0"/>
+          <a:chExt cx="0" cy="0"/>
+        </a:xfrm>
+      </p:grpSpPr>
+      <p:sp>
+        <p:nvSpPr>
+          <p:cNvPr id="2" name="Title 1"/>
+          <p:cNvSpPr>
+            <a:spLocks noGrp="1"/>
+          </p:cNvSpPr>
+          <p:nvPr>
+            <p:ph type="title"/>
+          </p:nvPr>
+        </p:nvSpPr>
+        <p:spPr/>
+        <p:txBody>
+          <a:bodyPr/>
+          <a:lstStyle/>
+          <a:p>
+            <a:r>
+              <a:rPr lang="en-BE" dirty="0" smtClean="0"/>
+              <a:t>Shinymanager: authentication &amp; site monitoring</a:t>
+            </a:r>
+            <a:endParaRPr lang="en-US" dirty="0"/>
+          </a:p>
+        </p:txBody>
+      </p:sp>
+      <p:sp>
+        <p:nvSpPr>
+          <p:cNvPr id="3" name="Content Placeholder 2"/>
+          <p:cNvSpPr>
+            <a:spLocks noGrp="1"/>
+          </p:cNvSpPr>
+          <p:nvPr>
+            <p:ph idx="1"/>
+          </p:nvPr>
+        </p:nvSpPr>
+        <p:spPr/>
+        <p:txBody>
+          <a:bodyPr>
+            <a:normAutofit lnSpcReduction="10000"/>
+          </a:bodyPr>
+          <a:lstStyle/>
+          <a:p>
+            <a:r>
+              <a:rPr lang="en-BE" dirty="0" smtClean="0"/>
+              <a:t>How to set it up locally:</a:t>
+            </a:r>
+          </a:p>
+          <a:p>
+            <a:pPr marL="914400" lvl="1" indent="-457200">
+              <a:buFont typeface="+mj-lt"/>
+              <a:buAutoNum type="arabicPeriod"/>
+            </a:pPr>
+            <a:r>
+              <a:rPr lang="en-BE" dirty="0" smtClean="0"/>
+              <a:t>Copy scripts/credentials_template.env to scripts/credentials.env </a:t>
+            </a:r>
+          </a:p>
+          <a:p>
+            <a:pPr marL="914400" lvl="1" indent="-457200">
+              <a:buFont typeface="+mj-lt"/>
+              <a:buAutoNum type="arabicPeriod"/>
+            </a:pPr>
+            <a:r>
+              <a:rPr lang="en-BE" dirty="0" smtClean="0"/>
+              <a:t>Modify credentials.env: configure shiny app username and password as well as sqlite encryption password</a:t>
+            </a:r>
+          </a:p>
+          <a:p>
+            <a:pPr marL="914400" lvl="1" indent="-457200">
+              <a:buFont typeface="+mj-lt"/>
+              <a:buAutoNum type="arabicPeriod"/>
+            </a:pPr>
+            <a:r>
+              <a:rPr lang="en-BE" dirty="0" smtClean="0"/>
+              <a:t>Run setup_credentials.R</a:t>
+            </a:r>
+          </a:p>
+          <a:p>
+            <a:pPr marL="914400" lvl="1" indent="-457200">
+              <a:buFont typeface="+mj-lt"/>
+              <a:buAutoNum type="arabicPeriod"/>
+            </a:pPr>
+            <a:r>
+              <a:rPr lang="en-BE" dirty="0" smtClean="0"/>
+              <a:t>Verify that db/credentials.db has been created</a:t>
+            </a:r>
+          </a:p>
+          <a:p>
+            <a:pPr marL="914400" lvl="1" indent="-457200">
+              <a:buFont typeface="+mj-lt"/>
+              <a:buAutoNum type="arabicPeriod"/>
+            </a:pPr>
+            <a:endParaRPr lang="en-BE" dirty="0"/>
+          </a:p>
+          <a:p>
+            <a:r>
+              <a:rPr lang="en-BE" dirty="0" smtClean="0"/>
+              <a:t>How to set it up in a docker image</a:t>
+            </a:r>
+          </a:p>
+          <a:p>
+            <a:pPr lvl="1"/>
+            <a:r>
+              <a:rPr lang="en-BE" dirty="0" smtClean="0"/>
+              <a:t>Replace steps 1 &amp; 2 above by setting up the environment variables through docker</a:t>
+            </a:r>
+          </a:p>
+          <a:p>
+            <a:pPr lvl="1"/>
+            <a:r>
+              <a:rPr lang="en-BE" smtClean="0"/>
+              <a:t>Perform 3 &amp; 4.</a:t>
+            </a:r>
+            <a:endParaRPr lang="en-BE" dirty="0" smtClean="0"/>
+          </a:p>
+        </p:txBody>
+      </p:sp>
+      <p:pic>
+        <p:nvPicPr>
+          <p:cNvPr id="4" name="Picture 3"/>
+          <p:cNvPicPr>
+            <a:picLocks noChangeAspect="1"/>
+          </p:cNvPicPr>
+          <p:nvPr/>
+        </p:nvPicPr>
+        <p:blipFill>
+          <a:blip r:embed="rId2"/>
+          <a:stretch>
+            <a:fillRect/>
+          </a:stretch>
+        </p:blipFill>
+        <p:spPr>
+          <a:xfrm>
+            <a:off x="10834144" y="1383618"/>
+            <a:ext cx="1181202" cy="1615580"/>
+          </a:xfrm>
+          <a:prstGeom prst="rect">
+            <a:avLst/>
+          </a:prstGeom>
+        </p:spPr>
+      </p:pic>
+    </p:spTree>
+    <p:extLst>
+      <p:ext uri="{BB962C8B-B14F-4D97-AF65-F5344CB8AC3E}">
+        <p14:creationId xmlns:p14="http://schemas.microsoft.com/office/powerpoint/2010/main" val="1061525508"/>
+      </p:ext>
+    </p:extLst>
+  </p:cSld>
+  <p:clrMapOvr>
+    <a:masterClrMapping/>
+  </p:clrMapOvr>
+</p:sld>
+</file>
+
+<file path=ppt/slides/slide17.xml><?xml version="1.0" encoding="utf-8"?>
 <p:sld xmlns:a="http://schemas.openxmlformats.org/drawingml/2006/main" xmlns:r="http://schemas.openxmlformats.org/officeDocument/2006/relationships" xmlns:p="http://schemas.openxmlformats.org/presentationml/2006/main">
   <p:cSld>
     <p:bg>
@@ -5393,7 +5755,7 @@
 </p:sld>
 </file>
 
-<file path=ppt/slides/slide17.xml><?xml version="1.0" encoding="utf-8"?>
+<file path=ppt/slides/slide18.xml><?xml version="1.0" encoding="utf-8"?>
 <p:sld xmlns:a="http://schemas.openxmlformats.org/drawingml/2006/main" xmlns:r="http://schemas.openxmlformats.org/officeDocument/2006/relationships" xmlns:p="http://schemas.openxmlformats.org/presentationml/2006/main">
   <p:cSld>
     <p:spTree>
@@ -8544,41 +8906,25 @@
           <a:p>
             <a:r>
               <a:rPr lang="nl-BE" dirty="0" smtClean="0"/>
-              <a:t>- reactive </a:t>
-            </a:r>
+              <a:t>- reactive expressions are recipes for how to calculate something, shiny will determine when it is required to execute</a:t>
+            </a:r>
+          </a:p>
+          <a:p>
             <a:r>
               <a:rPr lang="nl-BE" dirty="0" smtClean="0"/>
-              <a:t>expressions are recipes for how to calculate something, shiny will determine when it is required to execute</a:t>
+              <a:t>- can accept reactive input and deliver reactive output</a:t>
             </a:r>
           </a:p>
           <a:p>
             <a:r>
               <a:rPr lang="nl-BE" dirty="0" smtClean="0"/>
-              <a:t>- can </a:t>
-            </a:r>
+              <a:t>- has a cached result</a:t>
+            </a:r>
+          </a:p>
+          <a:p>
             <a:r>
               <a:rPr lang="nl-BE" dirty="0" smtClean="0"/>
-              <a:t>accept reactive input and deliver reactive output</a:t>
-            </a:r>
-          </a:p>
-          <a:p>
-            <a:r>
-              <a:rPr lang="nl-BE" dirty="0" smtClean="0"/>
-              <a:t>- has </a:t>
-            </a:r>
-            <a:r>
-              <a:rPr lang="nl-BE" dirty="0" smtClean="0"/>
-              <a:t>a cached result</a:t>
-            </a:r>
-          </a:p>
-          <a:p>
-            <a:r>
-              <a:rPr lang="nl-BE" dirty="0" smtClean="0"/>
-              <a:t>- make </a:t>
-            </a:r>
-            <a:r>
-              <a:rPr lang="nl-BE" dirty="0" smtClean="0"/>
-              <a:t>maximum use of this feature in shiny</a:t>
+              <a:t>- make maximum use of this feature in shiny</a:t>
             </a:r>
             <a:endParaRPr lang="en-US" dirty="0"/>
           </a:p>

</xml_diff>

<commit_message>
fix saxo data upload
</commit_message>
<xml_diff>
--- a/doc/stock_dashboard_documentation.pptx
+++ b/doc/stock_dashboard_documentation.pptx
@@ -22,9 +22,9 @@
     <p:sldId id="262" r:id="rId16"/>
     <p:sldId id="284" r:id="rId17"/>
     <p:sldId id="290" r:id="rId18"/>
-    <p:sldId id="289" r:id="rId19"/>
-    <p:sldId id="259" r:id="rId20"/>
-    <p:sldId id="260" r:id="rId21"/>
+    <p:sldId id="260" r:id="rId19"/>
+    <p:sldId id="289" r:id="rId20"/>
+    <p:sldId id="259" r:id="rId21"/>
     <p:sldId id="272" r:id="rId22"/>
     <p:sldId id="266" r:id="rId23"/>
     <p:sldId id="265" r:id="rId24"/>
@@ -4014,6 +4014,36 @@
           </a:prstGeom>
         </p:spPr>
       </p:pic>
+      <p:sp>
+        <p:nvSpPr>
+          <p:cNvPr id="7" name="TextBox 6"/>
+          <p:cNvSpPr txBox="1"/>
+          <p:nvPr/>
+        </p:nvSpPr>
+        <p:spPr>
+          <a:xfrm>
+            <a:off x="7861610" y="455583"/>
+            <a:ext cx="3166946" cy="369332"/>
+          </a:xfrm>
+          <a:prstGeom prst="rect">
+            <a:avLst/>
+          </a:prstGeom>
+          <a:noFill/>
+        </p:spPr>
+        <p:txBody>
+          <a:bodyPr wrap="square" rtlCol="0">
+            <a:spAutoFit/>
+          </a:bodyPr>
+          <a:lstStyle/>
+          <a:p>
+            <a:r>
+              <a:rPr lang="en-BE" dirty="0" smtClean="0"/>
+              <a:t>all records are unique</a:t>
+            </a:r>
+            <a:endParaRPr lang="nl-BE" dirty="0"/>
+          </a:p>
+        </p:txBody>
+      </p:sp>
     </p:spTree>
     <p:extLst>
       <p:ext uri="{BB962C8B-B14F-4D97-AF65-F5344CB8AC3E}">
@@ -5693,9 +5723,153 @@
           <a:chExt cx="0" cy="0"/>
         </a:xfrm>
       </p:grpSpPr>
+      <p:sp>
+        <p:nvSpPr>
+          <p:cNvPr id="2" name="Title 1"/>
+          <p:cNvSpPr>
+            <a:spLocks noGrp="1"/>
+          </p:cNvSpPr>
+          <p:nvPr>
+            <p:ph type="title"/>
+          </p:nvPr>
+        </p:nvSpPr>
+        <p:spPr>
+          <a:xfrm>
+            <a:off x="68525" y="-207198"/>
+            <a:ext cx="10515600" cy="1325563"/>
+          </a:xfrm>
+        </p:spPr>
+        <p:txBody>
+          <a:bodyPr/>
+          <a:lstStyle/>
+          <a:p>
+            <a:r>
+              <a:rPr lang="en-BE" dirty="0"/>
+              <a:t>transactions</a:t>
+            </a:r>
+            <a:r>
+              <a:rPr lang="en-BE" dirty="0" smtClean="0"/>
+              <a:t>: saxo </a:t>
+            </a:r>
+            <a:r>
+              <a:rPr lang="en-BE" dirty="0"/>
+              <a:t>import</a:t>
+            </a:r>
+            <a:endParaRPr lang="en-US" dirty="0"/>
+          </a:p>
+        </p:txBody>
+      </p:sp>
+      <p:sp>
+        <p:nvSpPr>
+          <p:cNvPr id="3" name="Content Placeholder 2"/>
+          <p:cNvSpPr>
+            <a:spLocks noGrp="1"/>
+          </p:cNvSpPr>
+          <p:nvPr>
+            <p:ph idx="1"/>
+          </p:nvPr>
+        </p:nvSpPr>
+        <p:spPr>
+          <a:xfrm>
+            <a:off x="203932" y="1052547"/>
+            <a:ext cx="4837626" cy="5499556"/>
+          </a:xfrm>
+        </p:spPr>
+        <p:txBody>
+          <a:bodyPr>
+            <a:normAutofit/>
+          </a:bodyPr>
+          <a:lstStyle/>
+          <a:p>
+            <a:r>
+              <a:rPr lang="nl-BE" sz="1600" dirty="0"/>
+              <a:t>log in op </a:t>
+            </a:r>
+            <a:r>
+              <a:rPr lang="nl-BE" sz="1600" dirty="0" smtClean="0"/>
+              <a:t>Saxo Investor</a:t>
+            </a:r>
+            <a:endParaRPr lang="nl-BE" sz="1600" dirty="0"/>
+          </a:p>
+          <a:p>
+            <a:r>
+              <a:rPr lang="nl-BE" sz="1600" dirty="0"/>
+              <a:t>gaar naar </a:t>
+            </a:r>
+            <a:r>
+              <a:rPr lang="nl-BE" sz="1600" dirty="0" smtClean="0"/>
+              <a:t>transacties</a:t>
+            </a:r>
+            <a:endParaRPr lang="nl-BE" sz="1600" dirty="0"/>
+          </a:p>
+          <a:p>
+            <a:r>
+              <a:rPr lang="nl-BE" sz="1600" dirty="0" smtClean="0"/>
+              <a:t>plaats aangepaste periode</a:t>
+            </a:r>
+            <a:endParaRPr lang="nl-BE" sz="1600" dirty="0"/>
+          </a:p>
+          <a:p>
+            <a:r>
+              <a:rPr lang="nl-BE" sz="1600" dirty="0" smtClean="0"/>
+              <a:t>exporteer als excel</a:t>
+            </a:r>
+            <a:endParaRPr lang="nl-BE" sz="1600" dirty="0"/>
+          </a:p>
+          <a:p>
+            <a:endParaRPr lang="nl-BE" sz="1600" dirty="0" smtClean="0"/>
+          </a:p>
+          <a:p>
+            <a:r>
+              <a:rPr lang="nl-BE" sz="1600" dirty="0"/>
+              <a:t>voeg een </a:t>
+            </a:r>
+            <a:r>
+              <a:rPr lang="nl-BE" sz="1600" i="1" dirty="0"/>
+              <a:t>symbol</a:t>
+            </a:r>
+            <a:r>
+              <a:rPr lang="nl-BE" sz="1600" dirty="0"/>
+              <a:t> kolom toe</a:t>
+            </a:r>
+          </a:p>
+          <a:p>
+            <a:r>
+              <a:rPr lang="nl-BE" sz="1600" dirty="0"/>
+              <a:t>vul het </a:t>
+            </a:r>
+            <a:r>
+              <a:rPr lang="nl-BE" sz="1600" dirty="0" smtClean="0"/>
+              <a:t>RIC als symbol in (minstens </a:t>
+            </a:r>
+            <a:r>
+              <a:rPr lang="nl-BE" sz="1600" dirty="0"/>
+              <a:t>1x per nieuwe </a:t>
+            </a:r>
+            <a:r>
+              <a:rPr lang="nl-BE" sz="1600" dirty="0" smtClean="0"/>
+              <a:t>stock)</a:t>
+            </a:r>
+            <a:endParaRPr lang="nl-BE" sz="1600" dirty="0"/>
+          </a:p>
+          <a:p>
+            <a:r>
+              <a:rPr lang="nl-BE" sz="1600" dirty="0"/>
+              <a:t>als er geen ‘nieuwe’ stocks zijn gekocht dan hoef je geen symbol in te vullen</a:t>
+            </a:r>
+            <a:endParaRPr lang="en-US" sz="1600" dirty="0"/>
+          </a:p>
+          <a:p>
+            <a:endParaRPr lang="en-US" sz="1600" dirty="0"/>
+          </a:p>
+          <a:p>
+            <a:endParaRPr lang="nl-BE" sz="1600" dirty="0" smtClean="0"/>
+          </a:p>
+        </p:txBody>
+      </p:sp>
       <p:pic>
         <p:nvPicPr>
-          <p:cNvPr id="4" name="Picture 3"/>
+          <p:cNvPr id="6" name="Picture 5"/>
           <p:cNvPicPr>
             <a:picLocks noChangeAspect="1"/>
           </p:cNvPicPr>
@@ -5709,8 +5883,8 @@
         </p:blipFill>
         <p:spPr>
           <a:xfrm>
-            <a:off x="2999678" y="2330605"/>
-            <a:ext cx="6690940" cy="3795089"/>
+            <a:off x="7737781" y="21292"/>
+            <a:ext cx="2400629" cy="4461714"/>
           </a:xfrm>
           <a:prstGeom prst="rect">
             <a:avLst/>
@@ -5719,22 +5893,22 @@
       </p:pic>
       <p:pic>
         <p:nvPicPr>
-          <p:cNvPr id="5" name="Picture 4"/>
+          <p:cNvPr id="7" name="Picture 6"/>
           <p:cNvPicPr>
             <a:picLocks noChangeAspect="1"/>
           </p:cNvPicPr>
           <p:nvPr/>
         </p:nvPicPr>
         <p:blipFill>
-          <a:blip r:embed="rId2"/>
+          <a:blip r:embed="rId3"/>
           <a:stretch>
             <a:fillRect/>
           </a:stretch>
         </p:blipFill>
         <p:spPr>
           <a:xfrm>
-            <a:off x="1460809" y="1594624"/>
-            <a:ext cx="6690940" cy="3795089"/>
+            <a:off x="546833" y="5742751"/>
+            <a:ext cx="11473718" cy="829842"/>
           </a:xfrm>
           <a:prstGeom prst="rect">
             <a:avLst/>
@@ -5744,7 +5918,7 @@
     </p:spTree>
     <p:extLst>
       <p:ext uri="{BB962C8B-B14F-4D97-AF65-F5344CB8AC3E}">
-        <p14:creationId xmlns:p14="http://schemas.microsoft.com/office/powerpoint/2010/main" val="1632147480"/>
+        <p14:creationId xmlns:p14="http://schemas.microsoft.com/office/powerpoint/2010/main" val="703887595"/>
       </p:ext>
     </p:extLst>
   </p:cSld>
@@ -5778,138 +5952,9 @@
           <a:chExt cx="0" cy="0"/>
         </a:xfrm>
       </p:grpSpPr>
-      <p:sp>
-        <p:nvSpPr>
-          <p:cNvPr id="2" name="Title 1"/>
-          <p:cNvSpPr>
-            <a:spLocks noGrp="1"/>
-          </p:cNvSpPr>
-          <p:nvPr>
-            <p:ph type="title"/>
-          </p:nvPr>
-        </p:nvSpPr>
-        <p:spPr>
-          <a:xfrm>
-            <a:off x="68525" y="-207198"/>
-            <a:ext cx="10515600" cy="1325563"/>
-          </a:xfrm>
-        </p:spPr>
-        <p:txBody>
-          <a:bodyPr/>
-          <a:lstStyle/>
-          <a:p>
-            <a:r>
-              <a:rPr lang="nl-BE" dirty="0" smtClean="0"/>
-              <a:t>BOLERO import xlsx</a:t>
-            </a:r>
-            <a:endParaRPr lang="en-US" dirty="0"/>
-          </a:p>
-        </p:txBody>
-      </p:sp>
-      <p:sp>
-        <p:nvSpPr>
-          <p:cNvPr id="3" name="Content Placeholder 2"/>
-          <p:cNvSpPr>
-            <a:spLocks noGrp="1"/>
-          </p:cNvSpPr>
-          <p:nvPr>
-            <p:ph idx="1"/>
-          </p:nvPr>
-        </p:nvSpPr>
-        <p:spPr>
-          <a:xfrm>
-            <a:off x="203932" y="1052547"/>
-            <a:ext cx="4837626" cy="5499556"/>
-          </a:xfrm>
-        </p:spPr>
-        <p:txBody>
-          <a:bodyPr>
-            <a:normAutofit/>
-          </a:bodyPr>
-          <a:lstStyle/>
-          <a:p>
-            <a:r>
-              <a:rPr lang="nl-BE" sz="2400" dirty="0"/>
-              <a:t>log in op bolero</a:t>
-            </a:r>
-          </a:p>
-          <a:p>
-            <a:r>
-              <a:rPr lang="nl-BE" sz="2400" dirty="0"/>
-              <a:t>gaar naar portefeuille</a:t>
-            </a:r>
-          </a:p>
-          <a:p>
-            <a:r>
-              <a:rPr lang="nl-BE" sz="2400" dirty="0"/>
-              <a:t>dan naar historiek</a:t>
-            </a:r>
-          </a:p>
-          <a:p>
-            <a:r>
-              <a:rPr lang="nl-BE" sz="2400" dirty="0"/>
-              <a:t>selecteer data en plak het in </a:t>
-            </a:r>
-            <a:r>
-              <a:rPr lang="nl-BE" sz="2400" dirty="0" smtClean="0"/>
-              <a:t>excel (via notepad tussenstap wordt html formatting verwijderd)</a:t>
-            </a:r>
-            <a:endParaRPr lang="nl-BE" sz="2400" dirty="0"/>
-          </a:p>
-          <a:p>
-            <a:endParaRPr lang="nl-BE" sz="2400" dirty="0" smtClean="0"/>
-          </a:p>
-          <a:p>
-            <a:r>
-              <a:rPr lang="nl-BE" sz="2400" dirty="0"/>
-              <a:t>voeg een </a:t>
-            </a:r>
-            <a:r>
-              <a:rPr lang="nl-BE" sz="2400" i="1" dirty="0"/>
-              <a:t>symbol</a:t>
-            </a:r>
-            <a:r>
-              <a:rPr lang="nl-BE" sz="2400" dirty="0"/>
-              <a:t> kolom toe</a:t>
-            </a:r>
-          </a:p>
-          <a:p>
-            <a:r>
-              <a:rPr lang="nl-BE" sz="2400" dirty="0"/>
-              <a:t>vul het </a:t>
-            </a:r>
-            <a:r>
-              <a:rPr lang="nl-BE" sz="2400" dirty="0" smtClean="0"/>
-              <a:t>RIC als symbol in (minstens </a:t>
-            </a:r>
-            <a:r>
-              <a:rPr lang="nl-BE" sz="2400" dirty="0"/>
-              <a:t>1x per nieuwe </a:t>
-            </a:r>
-            <a:r>
-              <a:rPr lang="nl-BE" sz="2400" dirty="0" smtClean="0"/>
-              <a:t>stock)</a:t>
-            </a:r>
-            <a:endParaRPr lang="nl-BE" sz="2400" dirty="0"/>
-          </a:p>
-          <a:p>
-            <a:r>
-              <a:rPr lang="nl-BE" sz="2400" dirty="0"/>
-              <a:t>als er geen ‘nieuwe’ stocks zijn gekocht dan hoef je geen symbol in te vullen</a:t>
-            </a:r>
-            <a:endParaRPr lang="en-US" sz="2400" dirty="0"/>
-          </a:p>
-          <a:p>
-            <a:endParaRPr lang="en-US" sz="2400" dirty="0"/>
-          </a:p>
-          <a:p>
-            <a:endParaRPr lang="nl-BE" sz="2200" dirty="0" smtClean="0"/>
-          </a:p>
-        </p:txBody>
-      </p:sp>
       <p:pic>
         <p:nvPicPr>
-          <p:cNvPr id="4" name="Content Placeholder 5"/>
+          <p:cNvPr id="4" name="Picture 3"/>
           <p:cNvPicPr>
             <a:picLocks noChangeAspect="1"/>
           </p:cNvPicPr>
@@ -5923,8 +5968,8 @@
         </p:blipFill>
         <p:spPr>
           <a:xfrm>
-            <a:off x="5235555" y="213069"/>
-            <a:ext cx="6650373" cy="2956440"/>
+            <a:off x="2999678" y="2330605"/>
+            <a:ext cx="6690940" cy="3795089"/>
           </a:xfrm>
           <a:prstGeom prst="rect">
             <a:avLst/>
@@ -5940,15 +5985,15 @@
           <p:nvPr/>
         </p:nvPicPr>
         <p:blipFill>
-          <a:blip r:embed="rId3"/>
+          <a:blip r:embed="rId2"/>
           <a:stretch>
             <a:fillRect/>
           </a:stretch>
         </p:blipFill>
         <p:spPr>
           <a:xfrm>
-            <a:off x="5283034" y="4063365"/>
-            <a:ext cx="6555414" cy="1720215"/>
+            <a:off x="1460809" y="1594624"/>
+            <a:ext cx="6690940" cy="3795089"/>
           </a:xfrm>
           <a:prstGeom prst="rect">
             <a:avLst/>
@@ -5958,7 +6003,7 @@
     </p:spTree>
     <p:extLst>
       <p:ext uri="{BB962C8B-B14F-4D97-AF65-F5344CB8AC3E}">
-        <p14:creationId xmlns:p14="http://schemas.microsoft.com/office/powerpoint/2010/main" val="8355119"/>
+        <p14:creationId xmlns:p14="http://schemas.microsoft.com/office/powerpoint/2010/main" val="1632147480"/>
       </p:ext>
     </p:extLst>
   </p:cSld>
@@ -6119,8 +6164,8 @@
           <a:lstStyle/>
           <a:p>
             <a:r>
-              <a:rPr lang="nl-BE"/>
-              <a:t>SAXO import xlsx</a:t>
+              <a:rPr lang="nl-BE" dirty="0" smtClean="0"/>
+              <a:t>BOLERO import xlsx</a:t>
             </a:r>
             <a:endParaRPr lang="en-US" dirty="0"/>
           </a:p>
@@ -6150,40 +6195,29 @@
           <a:p>
             <a:r>
               <a:rPr lang="nl-BE" sz="2400" dirty="0"/>
-              <a:t>log in </a:t>
-            </a:r>
-            <a:r>
-              <a:rPr lang="nl-BE" sz="2400"/>
-              <a:t>op </a:t>
-            </a:r>
-            <a:r>
-              <a:rPr lang="nl-BE" sz="2400" smtClean="0"/>
-              <a:t>Saxo Investor</a:t>
-            </a:r>
-            <a:endParaRPr lang="nl-BE" sz="2400" dirty="0"/>
+              <a:t>log in op bolero</a:t>
+            </a:r>
           </a:p>
           <a:p>
             <a:r>
               <a:rPr lang="nl-BE" sz="2400" dirty="0"/>
-              <a:t>gaar naar </a:t>
+              <a:t>gaar naar portefeuille</a:t>
+            </a:r>
+          </a:p>
+          <a:p>
+            <a:r>
+              <a:rPr lang="nl-BE" sz="2400" dirty="0"/>
+              <a:t>dan naar historiek</a:t>
+            </a:r>
+          </a:p>
+          <a:p>
+            <a:r>
+              <a:rPr lang="nl-BE" sz="2400" dirty="0"/>
+              <a:t>selecteer data en plak het in </a:t>
             </a:r>
             <a:r>
               <a:rPr lang="nl-BE" sz="2400" dirty="0" smtClean="0"/>
-              <a:t>transacties</a:t>
-            </a:r>
-            <a:endParaRPr lang="nl-BE" sz="2400" dirty="0"/>
-          </a:p>
-          <a:p>
-            <a:r>
-              <a:rPr lang="nl-BE" sz="2400" dirty="0" smtClean="0"/>
-              <a:t>plaats aangepaste periode</a:t>
-            </a:r>
-            <a:endParaRPr lang="nl-BE" sz="2400" dirty="0"/>
-          </a:p>
-          <a:p>
-            <a:r>
-              <a:rPr lang="nl-BE" sz="2400" dirty="0" smtClean="0"/>
-              <a:t>exporteer als excel</a:t>
+              <a:t>excel (via notepad tussenstap wordt html formatting verwijderd)</a:t>
             </a:r>
             <a:endParaRPr lang="nl-BE" sz="2400" dirty="0"/>
           </a:p>
@@ -6240,7 +6274,7 @@
       </p:sp>
       <p:pic>
         <p:nvPicPr>
-          <p:cNvPr id="6" name="Picture 5"/>
+          <p:cNvPr id="4" name="Content Placeholder 5"/>
           <p:cNvPicPr>
             <a:picLocks noChangeAspect="1"/>
           </p:cNvPicPr>
@@ -6254,8 +6288,8 @@
         </p:blipFill>
         <p:spPr>
           <a:xfrm>
-            <a:off x="7737781" y="21292"/>
-            <a:ext cx="2400629" cy="4461714"/>
+            <a:off x="5235555" y="213069"/>
+            <a:ext cx="6650373" cy="2956440"/>
           </a:xfrm>
           <a:prstGeom prst="rect">
             <a:avLst/>
@@ -6264,7 +6298,7 @@
       </p:pic>
       <p:pic>
         <p:nvPicPr>
-          <p:cNvPr id="7" name="Picture 6"/>
+          <p:cNvPr id="5" name="Picture 4"/>
           <p:cNvPicPr>
             <a:picLocks noChangeAspect="1"/>
           </p:cNvPicPr>
@@ -6278,8 +6312,8 @@
         </p:blipFill>
         <p:spPr>
           <a:xfrm>
-            <a:off x="546833" y="5742751"/>
-            <a:ext cx="11473718" cy="829842"/>
+            <a:off x="5283034" y="4063365"/>
+            <a:ext cx="6555414" cy="1720215"/>
           </a:xfrm>
           <a:prstGeom prst="rect">
             <a:avLst/>
@@ -6289,7 +6323,7 @@
     </p:spTree>
     <p:extLst>
       <p:ext uri="{BB962C8B-B14F-4D97-AF65-F5344CB8AC3E}">
-        <p14:creationId xmlns:p14="http://schemas.microsoft.com/office/powerpoint/2010/main" val="703887595"/>
+        <p14:creationId xmlns:p14="http://schemas.microsoft.com/office/powerpoint/2010/main" val="8355119"/>
       </p:ext>
     </p:extLst>
   </p:cSld>
@@ -11231,6 +11265,31 @@
             </a:r>
           </a:p>
           <a:p>
+            <a:r>
+              <a:rPr lang="en-BE" sz="1600" dirty="0" smtClean="0"/>
+              <a:t>ric: reuters instrument code (</a:t>
+            </a:r>
+            <a:r>
+              <a:rPr lang="nl-BE" sz="1600" dirty="0">
+                <a:hlinkClick r:id="rId2"/>
+              </a:rPr>
+              <a:t>https://</a:t>
+            </a:r>
+            <a:r>
+              <a:rPr lang="nl-BE" sz="1600" dirty="0" smtClean="0">
+                <a:hlinkClick r:id="rId2"/>
+              </a:rPr>
+              <a:t>en.wikipedia.org/wiki/Refinitiv_Identification_Code</a:t>
+            </a:r>
+            <a:r>
+              <a:rPr lang="en-BE" sz="1600" dirty="0" smtClean="0"/>
+              <a:t>)</a:t>
+            </a:r>
+          </a:p>
+          <a:p>
+            <a:endParaRPr lang="en-BE" sz="1600" dirty="0" smtClean="0"/>
+          </a:p>
+          <a:p>
             <a:pPr marL="0" indent="0">
               <a:buNone/>
             </a:pPr>
@@ -11640,15 +11699,7 @@
           <a:p>
             <a:r>
               <a:rPr lang="en-BE" sz="1600" dirty="0" smtClean="0"/>
-              <a:t>Shinymanager can store credentials </a:t>
-            </a:r>
-            <a:r>
-              <a:rPr lang="en-BE" sz="1600" dirty="0"/>
-              <a:t>are stored in </a:t>
-            </a:r>
-            <a:r>
-              <a:rPr lang="en-BE" sz="1600" dirty="0" smtClean="0"/>
-              <a:t>sqlite</a:t>
+              <a:t>Shinymanager can store credentials in sqlite</a:t>
             </a:r>
             <a:r>
               <a:rPr lang="en-US" sz="1600" dirty="0" smtClean="0"/>

</xml_diff>